<commit_message>
Update diagram structuring software
</commit_message>
<xml_diff>
--- a/doc/Structuring-With-OCM.pptx
+++ b/doc/Structuring-With-OCM.pptx
@@ -104,6 +104,11 @@
       </a:defRPr>
     </a:lvl9pPr>
   </p:defaultTextStyle>
+  <p:extLst>
+    <p:ext uri="{EFAFB233-063F-42B5-8137-9DF3F51BA10A}">
+      <p15:sldGuideLst xmlns:p15="http://schemas.microsoft.com/office/powerpoint/2012/main"/>
+    </p:ext>
+  </p:extLst>
 </p:presentation>
 </file>
 
@@ -256,7 +261,7 @@
           <a:p>
             <a:fld id="{7C8FFED5-C453-2E40-9490-A9D6F9554E37}" type="datetimeFigureOut">
               <a:rPr lang="en-DE" smtClean="0"/>
-              <a:t>02.02.23</a:t>
+              <a:t>10.03.23</a:t>
             </a:fld>
             <a:endParaRPr lang="en-DE"/>
           </a:p>
@@ -456,7 +461,7 @@
           <a:p>
             <a:fld id="{7C8FFED5-C453-2E40-9490-A9D6F9554E37}" type="datetimeFigureOut">
               <a:rPr lang="en-DE" smtClean="0"/>
-              <a:t>02.02.23</a:t>
+              <a:t>10.03.23</a:t>
             </a:fld>
             <a:endParaRPr lang="en-DE"/>
           </a:p>
@@ -666,7 +671,7 @@
           <a:p>
             <a:fld id="{7C8FFED5-C453-2E40-9490-A9D6F9554E37}" type="datetimeFigureOut">
               <a:rPr lang="en-DE" smtClean="0"/>
-              <a:t>02.02.23</a:t>
+              <a:t>10.03.23</a:t>
             </a:fld>
             <a:endParaRPr lang="en-DE"/>
           </a:p>
@@ -866,7 +871,7 @@
           <a:p>
             <a:fld id="{7C8FFED5-C453-2E40-9490-A9D6F9554E37}" type="datetimeFigureOut">
               <a:rPr lang="en-DE" smtClean="0"/>
-              <a:t>02.02.23</a:t>
+              <a:t>10.03.23</a:t>
             </a:fld>
             <a:endParaRPr lang="en-DE"/>
           </a:p>
@@ -1142,7 +1147,7 @@
           <a:p>
             <a:fld id="{7C8FFED5-C453-2E40-9490-A9D6F9554E37}" type="datetimeFigureOut">
               <a:rPr lang="en-DE" smtClean="0"/>
-              <a:t>02.02.23</a:t>
+              <a:t>10.03.23</a:t>
             </a:fld>
             <a:endParaRPr lang="en-DE"/>
           </a:p>
@@ -1410,7 +1415,7 @@
           <a:p>
             <a:fld id="{7C8FFED5-C453-2E40-9490-A9D6F9554E37}" type="datetimeFigureOut">
               <a:rPr lang="en-DE" smtClean="0"/>
-              <a:t>02.02.23</a:t>
+              <a:t>10.03.23</a:t>
             </a:fld>
             <a:endParaRPr lang="en-DE"/>
           </a:p>
@@ -1825,7 +1830,7 @@
           <a:p>
             <a:fld id="{7C8FFED5-C453-2E40-9490-A9D6F9554E37}" type="datetimeFigureOut">
               <a:rPr lang="en-DE" smtClean="0"/>
-              <a:t>02.02.23</a:t>
+              <a:t>10.03.23</a:t>
             </a:fld>
             <a:endParaRPr lang="en-DE"/>
           </a:p>
@@ -1967,7 +1972,7 @@
           <a:p>
             <a:fld id="{7C8FFED5-C453-2E40-9490-A9D6F9554E37}" type="datetimeFigureOut">
               <a:rPr lang="en-DE" smtClean="0"/>
-              <a:t>02.02.23</a:t>
+              <a:t>10.03.23</a:t>
             </a:fld>
             <a:endParaRPr lang="en-DE"/>
           </a:p>
@@ -2080,7 +2085,7 @@
           <a:p>
             <a:fld id="{7C8FFED5-C453-2E40-9490-A9D6F9554E37}" type="datetimeFigureOut">
               <a:rPr lang="en-DE" smtClean="0"/>
-              <a:t>02.02.23</a:t>
+              <a:t>10.03.23</a:t>
             </a:fld>
             <a:endParaRPr lang="en-DE"/>
           </a:p>
@@ -2393,7 +2398,7 @@
           <a:p>
             <a:fld id="{7C8FFED5-C453-2E40-9490-A9D6F9554E37}" type="datetimeFigureOut">
               <a:rPr lang="en-DE" smtClean="0"/>
-              <a:t>02.02.23</a:t>
+              <a:t>10.03.23</a:t>
             </a:fld>
             <a:endParaRPr lang="en-DE"/>
           </a:p>
@@ -2682,7 +2687,7 @@
           <a:p>
             <a:fld id="{7C8FFED5-C453-2E40-9490-A9D6F9554E37}" type="datetimeFigureOut">
               <a:rPr lang="en-DE" smtClean="0"/>
-              <a:t>02.02.23</a:t>
+              <a:t>10.03.23</a:t>
             </a:fld>
             <a:endParaRPr lang="en-DE"/>
           </a:p>
@@ -2925,7 +2930,7 @@
           <a:p>
             <a:fld id="{7C8FFED5-C453-2E40-9490-A9D6F9554E37}" type="datetimeFigureOut">
               <a:rPr lang="en-DE" smtClean="0"/>
-              <a:t>02.02.23</a:t>
+              <a:t>10.03.23</a:t>
             </a:fld>
             <a:endParaRPr lang="en-DE"/>
           </a:p>
@@ -3356,7 +3361,7 @@
         </p:nvGrpSpPr>
         <p:grpSpPr>
           <a:xfrm>
-            <a:off x="557049" y="1019503"/>
+            <a:off x="1451571" y="890294"/>
             <a:ext cx="9080937" cy="5302469"/>
             <a:chOff x="557049" y="1019503"/>
             <a:chExt cx="9080937" cy="5302469"/>
@@ -3550,13 +3555,6 @@
               <a:r>
                 <a:rPr lang="en-DE" dirty="0"/>
                 <a:t>MariaDB</a:t>
-              </a:r>
-            </a:p>
-            <a:p>
-              <a:pPr algn="ctr"/>
-              <a:r>
-                <a:rPr lang="en-DE" dirty="0"/>
-                <a:t>(Original MicroDB)</a:t>
               </a:r>
             </a:p>
           </p:txBody>
@@ -3756,13 +3754,6 @@
               <a:r>
                 <a:rPr lang="en-DE" dirty="0"/>
                 <a:t>Redis</a:t>
-              </a:r>
-            </a:p>
-            <a:p>
-              <a:pPr algn="ctr"/>
-              <a:r>
-                <a:rPr lang="en-DE" dirty="0"/>
-                <a:t>(to be done)</a:t>
               </a:r>
             </a:p>
           </p:txBody>

</xml_diff>